<commit_message>
Q.C. - Fix .pptx files to .pdf
</commit_message>
<xml_diff>
--- a/lukealk98/Seminar 1.pptx
+++ b/lukealk98/Seminar 1.pptx
@@ -4,6 +4,9 @@
   <p:sldMasterIdLst>
     <p:sldMasterId id="2147483648" r:id="rId1"/>
   </p:sldMasterIdLst>
+  <p:notesMasterIdLst>
+    <p:notesMasterId r:id="rId55"/>
+  </p:notesMasterIdLst>
   <p:sldIdLst>
     <p:sldId id="256" r:id="rId2"/>
     <p:sldId id="257" r:id="rId3"/>
@@ -44,18 +47,20 @@
     <p:sldId id="292" r:id="rId38"/>
     <p:sldId id="293" r:id="rId39"/>
     <p:sldId id="294" r:id="rId40"/>
-    <p:sldId id="295" r:id="rId41"/>
-    <p:sldId id="297" r:id="rId42"/>
-    <p:sldId id="298" r:id="rId43"/>
-    <p:sldId id="299" r:id="rId44"/>
-    <p:sldId id="300" r:id="rId45"/>
-    <p:sldId id="303" r:id="rId46"/>
-    <p:sldId id="310" r:id="rId47"/>
-    <p:sldId id="311" r:id="rId48"/>
-    <p:sldId id="307" r:id="rId49"/>
-    <p:sldId id="308" r:id="rId50"/>
-    <p:sldId id="309" r:id="rId51"/>
-    <p:sldId id="312" r:id="rId52"/>
+    <p:sldId id="314" r:id="rId41"/>
+    <p:sldId id="295" r:id="rId42"/>
+    <p:sldId id="297" r:id="rId43"/>
+    <p:sldId id="298" r:id="rId44"/>
+    <p:sldId id="313" r:id="rId45"/>
+    <p:sldId id="299" r:id="rId46"/>
+    <p:sldId id="300" r:id="rId47"/>
+    <p:sldId id="303" r:id="rId48"/>
+    <p:sldId id="310" r:id="rId49"/>
+    <p:sldId id="311" r:id="rId50"/>
+    <p:sldId id="307" r:id="rId51"/>
+    <p:sldId id="308" r:id="rId52"/>
+    <p:sldId id="309" r:id="rId53"/>
+    <p:sldId id="312" r:id="rId54"/>
   </p:sldIdLst>
   <p:sldSz cx="12192000" cy="6858000"/>
   <p:notesSz cx="6858000" cy="9144000"/>
@@ -162,6 +167,356 @@
 </p:presentation>
 </file>
 
+<file path=ppt/notesMasters/notesMaster1.xml><?xml version="1.0" encoding="utf-8"?>
+<p:notesMaster xmlns:a="http://schemas.openxmlformats.org/drawingml/2006/main" xmlns:r="http://schemas.openxmlformats.org/officeDocument/2006/relationships" xmlns:p="http://schemas.openxmlformats.org/presentationml/2006/main">
+  <p:cSld>
+    <p:bg>
+      <p:bgRef idx="1001">
+        <a:schemeClr val="bg1"/>
+      </p:bgRef>
+    </p:bg>
+    <p:spTree>
+      <p:nvGrpSpPr>
+        <p:cNvPr id="1" name=""/>
+        <p:cNvGrpSpPr/>
+        <p:nvPr/>
+      </p:nvGrpSpPr>
+      <p:grpSpPr>
+        <a:xfrm>
+          <a:off x="0" y="0"/>
+          <a:ext cx="0" cy="0"/>
+          <a:chOff x="0" y="0"/>
+          <a:chExt cx="0" cy="0"/>
+        </a:xfrm>
+      </p:grpSpPr>
+      <p:sp>
+        <p:nvSpPr>
+          <p:cNvPr id="2" name="Header Placeholder 1"/>
+          <p:cNvSpPr>
+            <a:spLocks noGrp="1"/>
+          </p:cNvSpPr>
+          <p:nvPr>
+            <p:ph type="hdr" sz="quarter"/>
+          </p:nvPr>
+        </p:nvSpPr>
+        <p:spPr>
+          <a:xfrm>
+            <a:off x="0" y="0"/>
+            <a:ext cx="2971800" cy="458788"/>
+          </a:xfrm>
+          <a:prstGeom prst="rect">
+            <a:avLst/>
+          </a:prstGeom>
+        </p:spPr>
+        <p:txBody>
+          <a:bodyPr vert="horz" lIns="91440" tIns="45720" rIns="91440" bIns="45720" rtlCol="0"/>
+          <a:lstStyle>
+            <a:lvl1pPr algn="l">
+              <a:defRPr sz="1200"/>
+            </a:lvl1pPr>
+          </a:lstStyle>
+          <a:p>
+            <a:endParaRPr lang="en-US"/>
+          </a:p>
+        </p:txBody>
+      </p:sp>
+      <p:sp>
+        <p:nvSpPr>
+          <p:cNvPr id="3" name="Date Placeholder 2"/>
+          <p:cNvSpPr>
+            <a:spLocks noGrp="1"/>
+          </p:cNvSpPr>
+          <p:nvPr>
+            <p:ph type="dt" idx="1"/>
+          </p:nvPr>
+        </p:nvSpPr>
+        <p:spPr>
+          <a:xfrm>
+            <a:off x="3884613" y="0"/>
+            <a:ext cx="2971800" cy="458788"/>
+          </a:xfrm>
+          <a:prstGeom prst="rect">
+            <a:avLst/>
+          </a:prstGeom>
+        </p:spPr>
+        <p:txBody>
+          <a:bodyPr vert="horz" lIns="91440" tIns="45720" rIns="91440" bIns="45720" rtlCol="0"/>
+          <a:lstStyle>
+            <a:lvl1pPr algn="r">
+              <a:defRPr sz="1200"/>
+            </a:lvl1pPr>
+          </a:lstStyle>
+          <a:p>
+            <a:fld id="{99FA49A7-6876-0242-ABD8-27E2DC5C7967}" type="datetimeFigureOut">
+              <a:rPr lang="en-US" smtClean="0"/>
+              <a:t>12/12/18</a:t>
+            </a:fld>
+            <a:endParaRPr lang="en-US"/>
+          </a:p>
+        </p:txBody>
+      </p:sp>
+      <p:sp>
+        <p:nvSpPr>
+          <p:cNvPr id="4" name="Slide Image Placeholder 3"/>
+          <p:cNvSpPr>
+            <a:spLocks noGrp="1" noRot="1" noChangeAspect="1"/>
+          </p:cNvSpPr>
+          <p:nvPr>
+            <p:ph type="sldImg" idx="2"/>
+          </p:nvPr>
+        </p:nvSpPr>
+        <p:spPr>
+          <a:xfrm>
+            <a:off x="685800" y="1143000"/>
+            <a:ext cx="5486400" cy="3086100"/>
+          </a:xfrm>
+          <a:prstGeom prst="rect">
+            <a:avLst/>
+          </a:prstGeom>
+          <a:noFill/>
+          <a:ln w="12700">
+            <a:solidFill>
+              <a:prstClr val="black"/>
+            </a:solidFill>
+          </a:ln>
+        </p:spPr>
+        <p:txBody>
+          <a:bodyPr vert="horz" lIns="91440" tIns="45720" rIns="91440" bIns="45720" rtlCol="0" anchor="ctr"/>
+          <a:lstStyle/>
+          <a:p>
+            <a:endParaRPr lang="en-US"/>
+          </a:p>
+        </p:txBody>
+      </p:sp>
+      <p:sp>
+        <p:nvSpPr>
+          <p:cNvPr id="5" name="Notes Placeholder 4"/>
+          <p:cNvSpPr>
+            <a:spLocks noGrp="1"/>
+          </p:cNvSpPr>
+          <p:nvPr>
+            <p:ph type="body" sz="quarter" idx="3"/>
+          </p:nvPr>
+        </p:nvSpPr>
+        <p:spPr>
+          <a:xfrm>
+            <a:off x="685800" y="4400550"/>
+            <a:ext cx="5486400" cy="3600450"/>
+          </a:xfrm>
+          <a:prstGeom prst="rect">
+            <a:avLst/>
+          </a:prstGeom>
+        </p:spPr>
+        <p:txBody>
+          <a:bodyPr vert="horz" lIns="91440" tIns="45720" rIns="91440" bIns="45720" rtlCol="0"/>
+          <a:lstStyle/>
+          <a:p>
+            <a:pPr lvl="0"/>
+            <a:r>
+              <a:rPr lang="en-US" smtClean="0"/>
+              <a:t>Click to edit Master text styles</a:t>
+            </a:r>
+          </a:p>
+          <a:p>
+            <a:pPr lvl="1"/>
+            <a:r>
+              <a:rPr lang="en-US" smtClean="0"/>
+              <a:t>Second level</a:t>
+            </a:r>
+          </a:p>
+          <a:p>
+            <a:pPr lvl="2"/>
+            <a:r>
+              <a:rPr lang="en-US" smtClean="0"/>
+              <a:t>Third level</a:t>
+            </a:r>
+          </a:p>
+          <a:p>
+            <a:pPr lvl="3"/>
+            <a:r>
+              <a:rPr lang="en-US" smtClean="0"/>
+              <a:t>Fourth level</a:t>
+            </a:r>
+          </a:p>
+          <a:p>
+            <a:pPr lvl="4"/>
+            <a:r>
+              <a:rPr lang="en-US" smtClean="0"/>
+              <a:t>Fifth level</a:t>
+            </a:r>
+            <a:endParaRPr lang="en-US"/>
+          </a:p>
+        </p:txBody>
+      </p:sp>
+      <p:sp>
+        <p:nvSpPr>
+          <p:cNvPr id="6" name="Footer Placeholder 5"/>
+          <p:cNvSpPr>
+            <a:spLocks noGrp="1"/>
+          </p:cNvSpPr>
+          <p:nvPr>
+            <p:ph type="ftr" sz="quarter" idx="4"/>
+          </p:nvPr>
+        </p:nvSpPr>
+        <p:spPr>
+          <a:xfrm>
+            <a:off x="0" y="8685213"/>
+            <a:ext cx="2971800" cy="458787"/>
+          </a:xfrm>
+          <a:prstGeom prst="rect">
+            <a:avLst/>
+          </a:prstGeom>
+        </p:spPr>
+        <p:txBody>
+          <a:bodyPr vert="horz" lIns="91440" tIns="45720" rIns="91440" bIns="45720" rtlCol="0" anchor="b"/>
+          <a:lstStyle>
+            <a:lvl1pPr algn="l">
+              <a:defRPr sz="1200"/>
+            </a:lvl1pPr>
+          </a:lstStyle>
+          <a:p>
+            <a:endParaRPr lang="en-US"/>
+          </a:p>
+        </p:txBody>
+      </p:sp>
+      <p:sp>
+        <p:nvSpPr>
+          <p:cNvPr id="7" name="Slide Number Placeholder 6"/>
+          <p:cNvSpPr>
+            <a:spLocks noGrp="1"/>
+          </p:cNvSpPr>
+          <p:nvPr>
+            <p:ph type="sldNum" sz="quarter" idx="5"/>
+          </p:nvPr>
+        </p:nvSpPr>
+        <p:spPr>
+          <a:xfrm>
+            <a:off x="3884613" y="8685213"/>
+            <a:ext cx="2971800" cy="458787"/>
+          </a:xfrm>
+          <a:prstGeom prst="rect">
+            <a:avLst/>
+          </a:prstGeom>
+        </p:spPr>
+        <p:txBody>
+          <a:bodyPr vert="horz" lIns="91440" tIns="45720" rIns="91440" bIns="45720" rtlCol="0" anchor="b"/>
+          <a:lstStyle>
+            <a:lvl1pPr algn="r">
+              <a:defRPr sz="1200"/>
+            </a:lvl1pPr>
+          </a:lstStyle>
+          <a:p>
+            <a:fld id="{7855289A-2FC4-6B4B-A358-53A64015D6DE}" type="slidenum">
+              <a:rPr lang="en-US" smtClean="0"/>
+              <a:t>‹#›</a:t>
+            </a:fld>
+            <a:endParaRPr lang="en-US"/>
+          </a:p>
+        </p:txBody>
+      </p:sp>
+    </p:spTree>
+    <p:extLst>
+      <p:ext uri="{BB962C8B-B14F-4D97-AF65-F5344CB8AC3E}">
+        <p14:creationId xmlns:p14="http://schemas.microsoft.com/office/powerpoint/2010/main" val="851178499"/>
+      </p:ext>
+    </p:extLst>
+  </p:cSld>
+  <p:clrMap bg1="lt1" tx1="dk1" bg2="lt2" tx2="dk2" accent1="accent1" accent2="accent2" accent3="accent3" accent4="accent4" accent5="accent5" accent6="accent6" hlink="hlink" folHlink="folHlink"/>
+  <p:notesStyle>
+    <a:lvl1pPr marL="0" algn="l" defTabSz="914400" rtl="0" eaLnBrk="1" latinLnBrk="0" hangingPunct="1">
+      <a:defRPr sz="1200" kern="1200">
+        <a:solidFill>
+          <a:schemeClr val="tx1"/>
+        </a:solidFill>
+        <a:latin typeface="+mn-lt"/>
+        <a:ea typeface="+mn-ea"/>
+        <a:cs typeface="+mn-cs"/>
+      </a:defRPr>
+    </a:lvl1pPr>
+    <a:lvl2pPr marL="457200" algn="l" defTabSz="914400" rtl="0" eaLnBrk="1" latinLnBrk="0" hangingPunct="1">
+      <a:defRPr sz="1200" kern="1200">
+        <a:solidFill>
+          <a:schemeClr val="tx1"/>
+        </a:solidFill>
+        <a:latin typeface="+mn-lt"/>
+        <a:ea typeface="+mn-ea"/>
+        <a:cs typeface="+mn-cs"/>
+      </a:defRPr>
+    </a:lvl2pPr>
+    <a:lvl3pPr marL="914400" algn="l" defTabSz="914400" rtl="0" eaLnBrk="1" latinLnBrk="0" hangingPunct="1">
+      <a:defRPr sz="1200" kern="1200">
+        <a:solidFill>
+          <a:schemeClr val="tx1"/>
+        </a:solidFill>
+        <a:latin typeface="+mn-lt"/>
+        <a:ea typeface="+mn-ea"/>
+        <a:cs typeface="+mn-cs"/>
+      </a:defRPr>
+    </a:lvl3pPr>
+    <a:lvl4pPr marL="1371600" algn="l" defTabSz="914400" rtl="0" eaLnBrk="1" latinLnBrk="0" hangingPunct="1">
+      <a:defRPr sz="1200" kern="1200">
+        <a:solidFill>
+          <a:schemeClr val="tx1"/>
+        </a:solidFill>
+        <a:latin typeface="+mn-lt"/>
+        <a:ea typeface="+mn-ea"/>
+        <a:cs typeface="+mn-cs"/>
+      </a:defRPr>
+    </a:lvl4pPr>
+    <a:lvl5pPr marL="1828800" algn="l" defTabSz="914400" rtl="0" eaLnBrk="1" latinLnBrk="0" hangingPunct="1">
+      <a:defRPr sz="1200" kern="1200">
+        <a:solidFill>
+          <a:schemeClr val="tx1"/>
+        </a:solidFill>
+        <a:latin typeface="+mn-lt"/>
+        <a:ea typeface="+mn-ea"/>
+        <a:cs typeface="+mn-cs"/>
+      </a:defRPr>
+    </a:lvl5pPr>
+    <a:lvl6pPr marL="2286000" algn="l" defTabSz="914400" rtl="0" eaLnBrk="1" latinLnBrk="0" hangingPunct="1">
+      <a:defRPr sz="1200" kern="1200">
+        <a:solidFill>
+          <a:schemeClr val="tx1"/>
+        </a:solidFill>
+        <a:latin typeface="+mn-lt"/>
+        <a:ea typeface="+mn-ea"/>
+        <a:cs typeface="+mn-cs"/>
+      </a:defRPr>
+    </a:lvl6pPr>
+    <a:lvl7pPr marL="2743200" algn="l" defTabSz="914400" rtl="0" eaLnBrk="1" latinLnBrk="0" hangingPunct="1">
+      <a:defRPr sz="1200" kern="1200">
+        <a:solidFill>
+          <a:schemeClr val="tx1"/>
+        </a:solidFill>
+        <a:latin typeface="+mn-lt"/>
+        <a:ea typeface="+mn-ea"/>
+        <a:cs typeface="+mn-cs"/>
+      </a:defRPr>
+    </a:lvl7pPr>
+    <a:lvl8pPr marL="3200400" algn="l" defTabSz="914400" rtl="0" eaLnBrk="1" latinLnBrk="0" hangingPunct="1">
+      <a:defRPr sz="1200" kern="1200">
+        <a:solidFill>
+          <a:schemeClr val="tx1"/>
+        </a:solidFill>
+        <a:latin typeface="+mn-lt"/>
+        <a:ea typeface="+mn-ea"/>
+        <a:cs typeface="+mn-cs"/>
+      </a:defRPr>
+    </a:lvl8pPr>
+    <a:lvl9pPr marL="3657600" algn="l" defTabSz="914400" rtl="0" eaLnBrk="1" latinLnBrk="0" hangingPunct="1">
+      <a:defRPr sz="1200" kern="1200">
+        <a:solidFill>
+          <a:schemeClr val="tx1"/>
+        </a:solidFill>
+        <a:latin typeface="+mn-lt"/>
+        <a:ea typeface="+mn-ea"/>
+        <a:cs typeface="+mn-cs"/>
+      </a:defRPr>
+    </a:lvl9pPr>
+  </p:notesStyle>
+</p:notesMaster>
+</file>
+
 <file path=ppt/slideLayouts/slideLayout1.xml><?xml version="1.0" encoding="utf-8"?>
 <p:sldLayout xmlns:a="http://schemas.openxmlformats.org/drawingml/2006/main" xmlns:r="http://schemas.openxmlformats.org/officeDocument/2006/relationships" xmlns:p="http://schemas.openxmlformats.org/presentationml/2006/main" type="title" preserve="1">
   <p:cSld name="Title Slide">
@@ -379,7 +734,7 @@
           <a:p>
             <a:fld id="{9AB3A824-1A51-4B26-AD58-A6D8E14F6C04}" type="datetimeFigureOut">
               <a:rPr lang="en-US" dirty="0"/>
-              <a:t>8/7/17</a:t>
+              <a:t>12/12/18</a:t>
             </a:fld>
             <a:endParaRPr lang="en-US" dirty="0"/>
           </a:p>
@@ -713,7 +1068,7 @@
           <a:p>
             <a:fld id="{D857E33E-8B18-4087-B112-809917729534}" type="datetimeFigureOut">
               <a:rPr lang="en-US" dirty="0"/>
-              <a:t>8/7/17</a:t>
+              <a:t>12/12/18</a:t>
             </a:fld>
             <a:endParaRPr lang="en-US" dirty="0"/>
           </a:p>
@@ -1015,7 +1370,7 @@
           <a:p>
             <a:fld id="{D3FFE419-2371-464F-8239-3959401C3561}" type="datetimeFigureOut">
               <a:rPr lang="en-US" dirty="0"/>
-              <a:t>8/7/17</a:t>
+              <a:t>12/12/18</a:t>
             </a:fld>
             <a:endParaRPr lang="en-US" dirty="0"/>
           </a:p>
@@ -1262,7 +1617,7 @@
           <a:p>
             <a:fld id="{97D162C4-EDD9-4389-A98B-B87ECEA2A816}" type="datetimeFigureOut">
               <a:rPr lang="en-US" dirty="0"/>
-              <a:t>8/7/17</a:t>
+              <a:t>12/12/18</a:t>
             </a:fld>
             <a:endParaRPr lang="en-US" dirty="0"/>
           </a:p>
@@ -1669,7 +2024,7 @@
           <a:p>
             <a:fld id="{3E5059C3-6A89-4494-99FF-5A4D6FFD50EB}" type="datetimeFigureOut">
               <a:rPr lang="en-US" dirty="0"/>
-              <a:t>8/7/17</a:t>
+              <a:t>12/12/18</a:t>
             </a:fld>
             <a:endParaRPr lang="en-US" dirty="0"/>
           </a:p>
@@ -1983,7 +2338,7 @@
           <a:p>
             <a:fld id="{CA954B2F-12DE-47F5-8894-472B206D2E1E}" type="datetimeFigureOut">
               <a:rPr lang="en-US" dirty="0"/>
-              <a:t>8/7/17</a:t>
+              <a:t>12/12/18</a:t>
             </a:fld>
             <a:endParaRPr lang="en-US" dirty="0"/>
           </a:p>
@@ -2527,7 +2882,7 @@
           <a:p>
             <a:fld id="{3F30E46F-7819-4ACF-B48B-48222C2ACC88}" type="datetimeFigureOut">
               <a:rPr lang="en-US" dirty="0"/>
-              <a:t>8/7/17</a:t>
+              <a:t>12/12/18</a:t>
             </a:fld>
             <a:endParaRPr lang="en-US" dirty="0"/>
           </a:p>
@@ -2722,7 +3077,7 @@
           <a:p>
             <a:fld id="{1FAF3416-4057-4DAA-829D-4CA07428D088}" type="datetimeFigureOut">
               <a:rPr lang="en-US" dirty="0"/>
-              <a:t>8/7/17</a:t>
+              <a:t>12/12/18</a:t>
             </a:fld>
             <a:endParaRPr lang="en-US" dirty="0"/>
           </a:p>
@@ -2935,7 +3290,7 @@
           <a:p>
             <a:fld id="{921D9284-D300-4297-87F7-E791DCC15DB1}" type="datetimeFigureOut">
               <a:rPr lang="en-US" dirty="0"/>
-              <a:t>8/7/17</a:t>
+              <a:t>12/12/18</a:t>
             </a:fld>
             <a:endParaRPr lang="en-US" dirty="0"/>
           </a:p>
@@ -3304,7 +3659,7 @@
           <a:p>
             <a:fld id="{37D525BB-DA17-4BA0-B3C8-3AC3ABC827E6}" type="datetimeFigureOut">
               <a:rPr lang="en-US" dirty="0"/>
-              <a:t>8/7/17</a:t>
+              <a:t>12/12/18</a:t>
             </a:fld>
             <a:endParaRPr lang="en-US" dirty="0"/>
           </a:p>
@@ -3707,7 +4062,7 @@
           <a:p>
             <a:fld id="{B16C4C9A-3960-41CF-A4E9-2A8FB932454B}" type="datetimeFigureOut">
               <a:rPr lang="en-US" dirty="0"/>
-              <a:t>8/7/17</a:t>
+              <a:t>12/12/18</a:t>
             </a:fld>
             <a:endParaRPr lang="en-US" dirty="0"/>
           </a:p>
@@ -4045,7 +4400,7 @@
           <a:p>
             <a:fld id="{3CBC1C18-307B-4F68-A007-B5B542270E8D}" type="datetimeFigureOut">
               <a:rPr lang="en-US" dirty="0"/>
-              <a:t>8/7/17</a:t>
+              <a:t>12/12/18</a:t>
             </a:fld>
             <a:endParaRPr lang="en-US" dirty="0"/>
           </a:p>
@@ -10718,6 +11073,262 @@
           </a:p>
         </p:txBody>
       </p:sp>
+    </p:spTree>
+    <p:extLst>
+      <p:ext uri="{BB962C8B-B14F-4D97-AF65-F5344CB8AC3E}">
+        <p14:creationId xmlns:p14="http://schemas.microsoft.com/office/powerpoint/2010/main" val="849434872"/>
+      </p:ext>
+    </p:extLst>
+  </p:cSld>
+  <p:clrMapOvr>
+    <a:masterClrMapping/>
+  </p:clrMapOvr>
+  <p:timing>
+    <p:tnLst>
+      <p:par>
+        <p:cTn id="1" dur="indefinite" restart="never" nodeType="tmRoot"/>
+      </p:par>
+    </p:tnLst>
+  </p:timing>
+</p:sld>
+</file>
+
+<file path=ppt/slides/slide4.xml><?xml version="1.0" encoding="utf-8"?>
+<p:sld xmlns:a="http://schemas.openxmlformats.org/drawingml/2006/main" xmlns:r="http://schemas.openxmlformats.org/officeDocument/2006/relationships" xmlns:p="http://schemas.openxmlformats.org/presentationml/2006/main">
+  <p:cSld>
+    <p:spTree>
+      <p:nvGrpSpPr>
+        <p:cNvPr id="1" name=""/>
+        <p:cNvGrpSpPr/>
+        <p:nvPr/>
+      </p:nvGrpSpPr>
+      <p:grpSpPr>
+        <a:xfrm>
+          <a:off x="0" y="0"/>
+          <a:ext cx="0" cy="0"/>
+          <a:chOff x="0" y="0"/>
+          <a:chExt cx="0" cy="0"/>
+        </a:xfrm>
+      </p:grpSpPr>
+      <p:sp>
+        <p:nvSpPr>
+          <p:cNvPr id="2" name="Title 1"/>
+          <p:cNvSpPr>
+            <a:spLocks noGrp="1"/>
+          </p:cNvSpPr>
+          <p:nvPr>
+            <p:ph type="title"/>
+          </p:nvPr>
+        </p:nvSpPr>
+        <p:spPr>
+          <a:xfrm>
+            <a:off x="2611808" y="550881"/>
+            <a:ext cx="7958331" cy="1077229"/>
+          </a:xfrm>
+        </p:spPr>
+        <p:txBody>
+          <a:bodyPr/>
+          <a:lstStyle/>
+          <a:p>
+            <a:r>
+              <a:rPr lang="en-GB" dirty="0" smtClean="0"/>
+              <a:t>Schedule</a:t>
+            </a:r>
+            <a:endParaRPr lang="en-GB" dirty="0"/>
+          </a:p>
+        </p:txBody>
+      </p:sp>
+      <p:sp>
+        <p:nvSpPr>
+          <p:cNvPr id="3" name="Content Placeholder 2"/>
+          <p:cNvSpPr>
+            <a:spLocks noGrp="1"/>
+          </p:cNvSpPr>
+          <p:nvPr>
+            <p:ph idx="1"/>
+          </p:nvPr>
+        </p:nvSpPr>
+        <p:spPr>
+          <a:xfrm>
+            <a:off x="2773599" y="1366316"/>
+            <a:ext cx="7796540" cy="5205934"/>
+          </a:xfrm>
+        </p:spPr>
+        <p:txBody>
+          <a:bodyPr>
+            <a:normAutofit/>
+          </a:bodyPr>
+          <a:lstStyle/>
+          <a:p>
+            <a:r>
+              <a:rPr lang="en-GB" dirty="0" smtClean="0"/>
+              <a:t>1. Introduction to Quantum Computing - Today</a:t>
+            </a:r>
+          </a:p>
+          <a:p>
+            <a:r>
+              <a:rPr lang="en-GB" dirty="0" smtClean="0"/>
+              <a:t>2. Some Formalisms in Quantum Mechanics</a:t>
+            </a:r>
+          </a:p>
+          <a:p>
+            <a:r>
+              <a:rPr lang="en-GB" dirty="0" smtClean="0"/>
+              <a:t>3. Quantum Computations</a:t>
+            </a:r>
+          </a:p>
+          <a:p>
+            <a:r>
+              <a:rPr lang="en-GB" dirty="0" smtClean="0"/>
+              <a:t>4. Realisations of Quantum Computers</a:t>
+            </a:r>
+          </a:p>
+          <a:p>
+            <a:r>
+              <a:rPr lang="en-GB" dirty="0" smtClean="0"/>
+              <a:t>5. Quantum Noise, Operations, and Distances</a:t>
+            </a:r>
+          </a:p>
+          <a:p>
+            <a:r>
+              <a:rPr lang="en-GB" dirty="0" smtClean="0"/>
+              <a:t>6. Error Corrections</a:t>
+            </a:r>
+          </a:p>
+          <a:p>
+            <a:r>
+              <a:rPr lang="en-GB" dirty="0" smtClean="0"/>
+              <a:t>7. Quantum Entropy &amp; Information Theory</a:t>
+            </a:r>
+          </a:p>
+          <a:p>
+            <a:r>
+              <a:rPr lang="en-GB" dirty="0" smtClean="0"/>
+              <a:t>* Unfortunately, I should study from topic 4.</a:t>
+            </a:r>
+          </a:p>
+        </p:txBody>
+      </p:sp>
+    </p:spTree>
+    <p:extLst>
+      <p:ext uri="{BB962C8B-B14F-4D97-AF65-F5344CB8AC3E}">
+        <p14:creationId xmlns:p14="http://schemas.microsoft.com/office/powerpoint/2010/main" val="658178890"/>
+      </p:ext>
+    </p:extLst>
+  </p:cSld>
+  <p:clrMapOvr>
+    <a:masterClrMapping/>
+  </p:clrMapOvr>
+  <p:timing>
+    <p:tnLst>
+      <p:par>
+        <p:cTn id="1" dur="indefinite" restart="never" nodeType="tmRoot"/>
+      </p:par>
+    </p:tnLst>
+  </p:timing>
+</p:sld>
+</file>
+
+<file path=ppt/slides/slide40.xml><?xml version="1.0" encoding="utf-8"?>
+<p:sld xmlns:a="http://schemas.openxmlformats.org/drawingml/2006/main" xmlns:r="http://schemas.openxmlformats.org/officeDocument/2006/relationships" xmlns:p="http://schemas.openxmlformats.org/presentationml/2006/main">
+  <p:cSld>
+    <p:spTree>
+      <p:nvGrpSpPr>
+        <p:cNvPr id="1" name=""/>
+        <p:cNvGrpSpPr/>
+        <p:nvPr/>
+      </p:nvGrpSpPr>
+      <p:grpSpPr>
+        <a:xfrm>
+          <a:off x="0" y="0"/>
+          <a:ext cx="0" cy="0"/>
+          <a:chOff x="0" y="0"/>
+          <a:chExt cx="0" cy="0"/>
+        </a:xfrm>
+      </p:grpSpPr>
+      <p:sp>
+        <p:nvSpPr>
+          <p:cNvPr id="2" name="Title 1"/>
+          <p:cNvSpPr>
+            <a:spLocks noGrp="1"/>
+          </p:cNvSpPr>
+          <p:nvPr>
+            <p:ph type="title"/>
+          </p:nvPr>
+        </p:nvSpPr>
+        <p:spPr/>
+        <p:txBody>
+          <a:bodyPr/>
+          <a:lstStyle/>
+          <a:p>
+            <a:r>
+              <a:rPr lang="en-GB" dirty="0"/>
+              <a:t>Generalisation: The Deutsch-</a:t>
+            </a:r>
+            <a:r>
+              <a:rPr lang="en-GB" dirty="0" err="1"/>
+              <a:t>Jozsa</a:t>
+            </a:r>
+            <a:r>
+              <a:rPr lang="en-GB" dirty="0"/>
+              <a:t> Algorithm</a:t>
+            </a:r>
+          </a:p>
+        </p:txBody>
+      </p:sp>
+      <p:sp>
+        <p:nvSpPr>
+          <p:cNvPr id="3" name="Content Placeholder 2"/>
+          <p:cNvSpPr>
+            <a:spLocks noGrp="1"/>
+          </p:cNvSpPr>
+          <p:nvPr>
+            <p:ph idx="1"/>
+          </p:nvPr>
+        </p:nvSpPr>
+        <p:spPr/>
+        <p:txBody>
+          <a:bodyPr/>
+          <a:lstStyle/>
+          <a:p>
+            <a:r>
+              <a:rPr lang="en-GB" dirty="0" smtClean="0"/>
+              <a:t>Classical: </a:t>
+            </a:r>
+            <a:r>
+              <a:rPr lang="en-GB" dirty="0" err="1" smtClean="0"/>
+              <a:t>Srsly</a:t>
+            </a:r>
+            <a:r>
+              <a:rPr lang="en-GB" dirty="0" smtClean="0"/>
+              <a:t>, we need to calculate exponential amount of data</a:t>
+            </a:r>
+            <a:r>
+              <a:rPr lang="mr-IN" dirty="0" smtClean="0"/>
+              <a:t>…</a:t>
+            </a:r>
+            <a:endParaRPr lang="en-GB" dirty="0" smtClean="0"/>
+          </a:p>
+          <a:p>
+            <a:r>
+              <a:rPr lang="en-GB" dirty="0" smtClean="0"/>
+              <a:t>Quantum: We are good to go in one attempt!</a:t>
+            </a:r>
+          </a:p>
+          <a:p>
+            <a:endParaRPr lang="en-GB" dirty="0"/>
+          </a:p>
+          <a:p>
+            <a:endParaRPr lang="en-GB" dirty="0" smtClean="0"/>
+          </a:p>
+          <a:p>
+            <a:endParaRPr lang="en-GB" dirty="0"/>
+          </a:p>
+          <a:p>
+            <a:endParaRPr lang="en-GB" dirty="0"/>
+          </a:p>
+        </p:txBody>
+      </p:sp>
       <p:pic>
         <p:nvPicPr>
           <p:cNvPr id="4" name="Picture 3"/>
@@ -10751,7 +11362,7 @@
     </p:spTree>
     <p:extLst>
       <p:ext uri="{BB962C8B-B14F-4D97-AF65-F5344CB8AC3E}">
-        <p14:creationId xmlns:p14="http://schemas.microsoft.com/office/powerpoint/2010/main" val="849434872"/>
+        <p14:creationId xmlns:p14="http://schemas.microsoft.com/office/powerpoint/2010/main" val="860819663"/>
       </p:ext>
     </p:extLst>
   </p:cSld>
@@ -10844,240 +11455,6 @@
 </p:sld>
 </file>
 
-<file path=ppt/slides/slide4.xml><?xml version="1.0" encoding="utf-8"?>
-<p:sld xmlns:a="http://schemas.openxmlformats.org/drawingml/2006/main" xmlns:r="http://schemas.openxmlformats.org/officeDocument/2006/relationships" xmlns:p="http://schemas.openxmlformats.org/presentationml/2006/main">
-  <p:cSld>
-    <p:spTree>
-      <p:nvGrpSpPr>
-        <p:cNvPr id="1" name=""/>
-        <p:cNvGrpSpPr/>
-        <p:nvPr/>
-      </p:nvGrpSpPr>
-      <p:grpSpPr>
-        <a:xfrm>
-          <a:off x="0" y="0"/>
-          <a:ext cx="0" cy="0"/>
-          <a:chOff x="0" y="0"/>
-          <a:chExt cx="0" cy="0"/>
-        </a:xfrm>
-      </p:grpSpPr>
-      <p:sp>
-        <p:nvSpPr>
-          <p:cNvPr id="2" name="Title 1"/>
-          <p:cNvSpPr>
-            <a:spLocks noGrp="1"/>
-          </p:cNvSpPr>
-          <p:nvPr>
-            <p:ph type="title"/>
-          </p:nvPr>
-        </p:nvSpPr>
-        <p:spPr>
-          <a:xfrm>
-            <a:off x="2611808" y="550881"/>
-            <a:ext cx="7958331" cy="1077229"/>
-          </a:xfrm>
-        </p:spPr>
-        <p:txBody>
-          <a:bodyPr/>
-          <a:lstStyle/>
-          <a:p>
-            <a:r>
-              <a:rPr lang="en-GB" dirty="0" smtClean="0"/>
-              <a:t>Schedule</a:t>
-            </a:r>
-            <a:endParaRPr lang="en-GB" dirty="0"/>
-          </a:p>
-        </p:txBody>
-      </p:sp>
-      <p:sp>
-        <p:nvSpPr>
-          <p:cNvPr id="3" name="Content Placeholder 2"/>
-          <p:cNvSpPr>
-            <a:spLocks noGrp="1"/>
-          </p:cNvSpPr>
-          <p:nvPr>
-            <p:ph idx="1"/>
-          </p:nvPr>
-        </p:nvSpPr>
-        <p:spPr>
-          <a:xfrm>
-            <a:off x="2773599" y="1366316"/>
-            <a:ext cx="7796540" cy="5205934"/>
-          </a:xfrm>
-        </p:spPr>
-        <p:txBody>
-          <a:bodyPr>
-            <a:normAutofit/>
-          </a:bodyPr>
-          <a:lstStyle/>
-          <a:p>
-            <a:r>
-              <a:rPr lang="en-GB" dirty="0" smtClean="0"/>
-              <a:t>1. Introduction to Quantum Computing - Today</a:t>
-            </a:r>
-          </a:p>
-          <a:p>
-            <a:r>
-              <a:rPr lang="en-GB" dirty="0" smtClean="0"/>
-              <a:t>2. Some Formalisms in Quantum Mechanics</a:t>
-            </a:r>
-          </a:p>
-          <a:p>
-            <a:r>
-              <a:rPr lang="en-GB" dirty="0" smtClean="0"/>
-              <a:t>3. Quantum Computations</a:t>
-            </a:r>
-          </a:p>
-          <a:p>
-            <a:r>
-              <a:rPr lang="en-GB" dirty="0" smtClean="0"/>
-              <a:t>4. Realisations of Quantum Computers</a:t>
-            </a:r>
-          </a:p>
-          <a:p>
-            <a:r>
-              <a:rPr lang="en-GB" dirty="0" smtClean="0"/>
-              <a:t>5. Quantum Noise, Operations, and Distances</a:t>
-            </a:r>
-          </a:p>
-          <a:p>
-            <a:r>
-              <a:rPr lang="en-GB" dirty="0" smtClean="0"/>
-              <a:t>6. Error Corrections</a:t>
-            </a:r>
-          </a:p>
-          <a:p>
-            <a:r>
-              <a:rPr lang="en-GB" dirty="0" smtClean="0"/>
-              <a:t>7. Quantum Entropy &amp; Information Theory</a:t>
-            </a:r>
-          </a:p>
-          <a:p>
-            <a:r>
-              <a:rPr lang="en-GB" dirty="0" smtClean="0"/>
-              <a:t>* Unfortunately, I should study from topic 4.</a:t>
-            </a:r>
-          </a:p>
-        </p:txBody>
-      </p:sp>
-    </p:spTree>
-    <p:extLst>
-      <p:ext uri="{BB962C8B-B14F-4D97-AF65-F5344CB8AC3E}">
-        <p14:creationId xmlns:p14="http://schemas.microsoft.com/office/powerpoint/2010/main" val="658178890"/>
-      </p:ext>
-    </p:extLst>
-  </p:cSld>
-  <p:clrMapOvr>
-    <a:masterClrMapping/>
-  </p:clrMapOvr>
-  <p:timing>
-    <p:tnLst>
-      <p:par>
-        <p:cTn id="1" dur="indefinite" restart="never" nodeType="tmRoot"/>
-      </p:par>
-    </p:tnLst>
-  </p:timing>
-</p:sld>
-</file>
-
-<file path=ppt/slides/slide40.xml><?xml version="1.0" encoding="utf-8"?>
-<p:sld xmlns:a="http://schemas.openxmlformats.org/drawingml/2006/main" xmlns:r="http://schemas.openxmlformats.org/officeDocument/2006/relationships" xmlns:p="http://schemas.openxmlformats.org/presentationml/2006/main">
-  <p:cSld>
-    <p:spTree>
-      <p:nvGrpSpPr>
-        <p:cNvPr id="1" name=""/>
-        <p:cNvGrpSpPr/>
-        <p:nvPr/>
-      </p:nvGrpSpPr>
-      <p:grpSpPr>
-        <a:xfrm>
-          <a:off x="0" y="0"/>
-          <a:ext cx="0" cy="0"/>
-          <a:chOff x="0" y="0"/>
-          <a:chExt cx="0" cy="0"/>
-        </a:xfrm>
-      </p:grpSpPr>
-      <p:sp>
-        <p:nvSpPr>
-          <p:cNvPr id="2" name="Title 1"/>
-          <p:cNvSpPr>
-            <a:spLocks noGrp="1"/>
-          </p:cNvSpPr>
-          <p:nvPr>
-            <p:ph type="title"/>
-          </p:nvPr>
-        </p:nvSpPr>
-        <p:spPr/>
-        <p:txBody>
-          <a:bodyPr/>
-          <a:lstStyle/>
-          <a:p>
-            <a:r>
-              <a:rPr lang="en-GB" dirty="0"/>
-              <a:t>Generalisation: The Deutsch-</a:t>
-            </a:r>
-            <a:r>
-              <a:rPr lang="en-GB" dirty="0" err="1"/>
-              <a:t>Jozsa</a:t>
-            </a:r>
-            <a:r>
-              <a:rPr lang="en-GB" dirty="0"/>
-              <a:t> Algorithm</a:t>
-            </a:r>
-          </a:p>
-        </p:txBody>
-      </p:sp>
-      <p:sp>
-        <p:nvSpPr>
-          <p:cNvPr id="3" name="Content Placeholder 2"/>
-          <p:cNvSpPr>
-            <a:spLocks noGrp="1"/>
-          </p:cNvSpPr>
-          <p:nvPr>
-            <p:ph idx="1"/>
-          </p:nvPr>
-        </p:nvSpPr>
-        <p:spPr/>
-        <p:txBody>
-          <a:bodyPr/>
-          <a:lstStyle/>
-          <a:p>
-            <a:r>
-              <a:rPr lang="en-GB" dirty="0" smtClean="0"/>
-              <a:t>Few Caveats though exist:</a:t>
-            </a:r>
-          </a:p>
-          <a:p>
-            <a:endParaRPr lang="en-GB" dirty="0"/>
-          </a:p>
-          <a:p>
-            <a:r>
-              <a:rPr lang="en-GB" dirty="0" smtClean="0"/>
-              <a:t>1. What if we just use a probabilistic classical computer? Few trial and error will be sufficient.</a:t>
-            </a:r>
-          </a:p>
-          <a:p>
-            <a:r>
-              <a:rPr lang="en-GB" dirty="0" smtClean="0"/>
-              <a:t>2. The Deutsch Problem does not have any practical applications.</a:t>
-            </a:r>
-            <a:endParaRPr lang="en-GB" dirty="0"/>
-          </a:p>
-        </p:txBody>
-      </p:sp>
-    </p:spTree>
-    <p:extLst>
-      <p:ext uri="{BB962C8B-B14F-4D97-AF65-F5344CB8AC3E}">
-        <p14:creationId xmlns:p14="http://schemas.microsoft.com/office/powerpoint/2010/main" val="2128092095"/>
-      </p:ext>
-    </p:extLst>
-  </p:cSld>
-  <p:clrMapOvr>
-    <a:masterClrMapping/>
-  </p:clrMapOvr>
-</p:sld>
-</file>
-
 <file path=ppt/slides/slide41.xml><?xml version="1.0" encoding="utf-8"?>
 <p:sld xmlns:a="http://schemas.openxmlformats.org/drawingml/2006/main" xmlns:r="http://schemas.openxmlformats.org/officeDocument/2006/relationships" xmlns:p="http://schemas.openxmlformats.org/presentationml/2006/main">
   <p:cSld>
@@ -11111,6 +11488,104 @@
           <a:lstStyle/>
           <a:p>
             <a:r>
+              <a:rPr lang="en-GB" dirty="0"/>
+              <a:t>Generalisation: The Deutsch-</a:t>
+            </a:r>
+            <a:r>
+              <a:rPr lang="en-GB" dirty="0" err="1"/>
+              <a:t>Jozsa</a:t>
+            </a:r>
+            <a:r>
+              <a:rPr lang="en-GB" dirty="0"/>
+              <a:t> Algorithm</a:t>
+            </a:r>
+          </a:p>
+        </p:txBody>
+      </p:sp>
+      <p:sp>
+        <p:nvSpPr>
+          <p:cNvPr id="3" name="Content Placeholder 2"/>
+          <p:cNvSpPr>
+            <a:spLocks noGrp="1"/>
+          </p:cNvSpPr>
+          <p:nvPr>
+            <p:ph idx="1"/>
+          </p:nvPr>
+        </p:nvSpPr>
+        <p:spPr/>
+        <p:txBody>
+          <a:bodyPr/>
+          <a:lstStyle/>
+          <a:p>
+            <a:r>
+              <a:rPr lang="en-GB" dirty="0" smtClean="0"/>
+              <a:t>Few Caveats though exist:</a:t>
+            </a:r>
+          </a:p>
+          <a:p>
+            <a:endParaRPr lang="en-GB" dirty="0"/>
+          </a:p>
+          <a:p>
+            <a:r>
+              <a:rPr lang="en-GB" dirty="0" smtClean="0"/>
+              <a:t>1. What if we just use a probabilistic classical computer? Few trial and error will be sufficient.</a:t>
+            </a:r>
+          </a:p>
+          <a:p>
+            <a:r>
+              <a:rPr lang="en-GB" dirty="0" smtClean="0"/>
+              <a:t>2. The Deutsch Problem does not have any practical applications.</a:t>
+            </a:r>
+            <a:endParaRPr lang="en-GB" dirty="0"/>
+          </a:p>
+        </p:txBody>
+      </p:sp>
+    </p:spTree>
+    <p:extLst>
+      <p:ext uri="{BB962C8B-B14F-4D97-AF65-F5344CB8AC3E}">
+        <p14:creationId xmlns:p14="http://schemas.microsoft.com/office/powerpoint/2010/main" val="2128092095"/>
+      </p:ext>
+    </p:extLst>
+  </p:cSld>
+  <p:clrMapOvr>
+    <a:masterClrMapping/>
+  </p:clrMapOvr>
+</p:sld>
+</file>
+
+<file path=ppt/slides/slide42.xml><?xml version="1.0" encoding="utf-8"?>
+<p:sld xmlns:a="http://schemas.openxmlformats.org/drawingml/2006/main" xmlns:r="http://schemas.openxmlformats.org/officeDocument/2006/relationships" xmlns:p="http://schemas.openxmlformats.org/presentationml/2006/main">
+  <p:cSld>
+    <p:spTree>
+      <p:nvGrpSpPr>
+        <p:cNvPr id="1" name=""/>
+        <p:cNvGrpSpPr/>
+        <p:nvPr/>
+      </p:nvGrpSpPr>
+      <p:grpSpPr>
+        <a:xfrm>
+          <a:off x="0" y="0"/>
+          <a:ext cx="0" cy="0"/>
+          <a:chOff x="0" y="0"/>
+          <a:chExt cx="0" cy="0"/>
+        </a:xfrm>
+      </p:grpSpPr>
+      <p:sp>
+        <p:nvSpPr>
+          <p:cNvPr id="2" name="Title 1"/>
+          <p:cNvSpPr>
+            <a:spLocks noGrp="1"/>
+          </p:cNvSpPr>
+          <p:nvPr>
+            <p:ph type="title"/>
+          </p:nvPr>
+        </p:nvSpPr>
+        <p:spPr/>
+        <p:txBody>
+          <a:bodyPr/>
+          <a:lstStyle/>
+          <a:p>
+            <a:r>
               <a:rPr lang="en-GB" dirty="0" smtClean="0"/>
               <a:t>Other Quantum Algorithms</a:t>
             </a:r>
@@ -11189,7 +11664,168 @@
 </p:sld>
 </file>
 
-<file path=ppt/slides/slide42.xml><?xml version="1.0" encoding="utf-8"?>
+<file path=ppt/slides/slide43.xml><?xml version="1.0" encoding="utf-8"?>
+<p:sld xmlns:a="http://schemas.openxmlformats.org/drawingml/2006/main" xmlns:r="http://schemas.openxmlformats.org/officeDocument/2006/relationships" xmlns:p="http://schemas.openxmlformats.org/presentationml/2006/main">
+  <p:cSld>
+    <p:spTree>
+      <p:nvGrpSpPr>
+        <p:cNvPr id="1" name=""/>
+        <p:cNvGrpSpPr/>
+        <p:nvPr/>
+      </p:nvGrpSpPr>
+      <p:grpSpPr>
+        <a:xfrm>
+          <a:off x="0" y="0"/>
+          <a:ext cx="0" cy="0"/>
+          <a:chOff x="0" y="0"/>
+          <a:chExt cx="0" cy="0"/>
+        </a:xfrm>
+      </p:grpSpPr>
+      <p:sp>
+        <p:nvSpPr>
+          <p:cNvPr id="2" name="Title 1"/>
+          <p:cNvSpPr>
+            <a:spLocks noGrp="1"/>
+          </p:cNvSpPr>
+          <p:nvPr>
+            <p:ph type="title"/>
+          </p:nvPr>
+        </p:nvSpPr>
+        <p:spPr/>
+        <p:txBody>
+          <a:bodyPr/>
+          <a:lstStyle/>
+          <a:p>
+            <a:r>
+              <a:rPr lang="en-GB" dirty="0" smtClean="0"/>
+              <a:t>Computational Complexity Theory</a:t>
+            </a:r>
+            <a:endParaRPr lang="en-GB" dirty="0"/>
+          </a:p>
+        </p:txBody>
+      </p:sp>
+      <p:sp>
+        <p:nvSpPr>
+          <p:cNvPr id="3" name="Content Placeholder 2"/>
+          <p:cNvSpPr>
+            <a:spLocks noGrp="1"/>
+          </p:cNvSpPr>
+          <p:nvPr>
+            <p:ph idx="1"/>
+          </p:nvPr>
+        </p:nvSpPr>
+        <p:spPr>
+          <a:xfrm>
+            <a:off x="2773599" y="2052115"/>
+            <a:ext cx="7796540" cy="4514939"/>
+          </a:xfrm>
+        </p:spPr>
+        <p:txBody>
+          <a:bodyPr>
+            <a:normAutofit fontScale="92500" lnSpcReduction="10000"/>
+          </a:bodyPr>
+          <a:lstStyle/>
+          <a:p>
+            <a:r>
+              <a:rPr lang="en-GB" dirty="0" smtClean="0"/>
+              <a:t>P: </a:t>
+            </a:r>
+            <a:r>
+              <a:rPr lang="en-GB" dirty="0"/>
+              <a:t>class of computational problems that can be solved quickly on a classical computer </a:t>
+            </a:r>
+          </a:p>
+          <a:p>
+            <a:r>
+              <a:rPr lang="en-GB" dirty="0" smtClean="0"/>
+              <a:t>NP: </a:t>
+            </a:r>
+            <a:r>
+              <a:rPr lang="en-GB" dirty="0"/>
+              <a:t>class of problems which have solutions which can be quickly checked on a classical computer </a:t>
+            </a:r>
+          </a:p>
+          <a:p>
+            <a:r>
+              <a:rPr lang="en-GB" dirty="0" smtClean="0"/>
+              <a:t>PSAPCE: </a:t>
+            </a:r>
+            <a:r>
+              <a:rPr lang="en-GB" dirty="0"/>
+              <a:t>problems which can be solved using resources which are few in spatial </a:t>
+            </a:r>
+            <a:r>
+              <a:rPr lang="en-GB" dirty="0" smtClean="0"/>
+              <a:t>size, </a:t>
+            </a:r>
+            <a:r>
+              <a:rPr lang="en-GB" dirty="0"/>
+              <a:t>but not necessarily in </a:t>
+            </a:r>
+            <a:r>
+              <a:rPr lang="en-GB" dirty="0" smtClean="0"/>
+              <a:t>time</a:t>
+            </a:r>
+            <a:br>
+              <a:rPr lang="en-GB" dirty="0" smtClean="0"/>
+            </a:br>
+            <a:r>
+              <a:rPr lang="en-GB" dirty="0" smtClean="0"/>
+              <a:t> -&gt; Assumed to be larger than P and NP but never proved</a:t>
+            </a:r>
+          </a:p>
+          <a:p>
+            <a:r>
+              <a:rPr lang="en-GB" dirty="0" smtClean="0"/>
+              <a:t>BPP: </a:t>
+            </a:r>
+            <a:r>
+              <a:rPr lang="en-GB" dirty="0"/>
+              <a:t>class of problems that can be solved using randomized algorithms in polynomial time, if a bounded probability of error </a:t>
+            </a:r>
+            <a:r>
+              <a:rPr lang="en-GB" dirty="0" smtClean="0"/>
+              <a:t>is </a:t>
+            </a:r>
+            <a:r>
+              <a:rPr lang="en-GB" dirty="0"/>
+              <a:t>allowed in the solution to the problem. </a:t>
+            </a:r>
+            <a:endParaRPr lang="en-GB" dirty="0" smtClean="0"/>
+          </a:p>
+          <a:p>
+            <a:r>
+              <a:rPr lang="en-GB" dirty="0" smtClean="0"/>
+              <a:t>BQP: Analogue of BPP in Quantum Computing.</a:t>
+            </a:r>
+            <a:endParaRPr lang="en-GB" dirty="0"/>
+          </a:p>
+          <a:p>
+            <a:endParaRPr lang="en-GB" dirty="0"/>
+          </a:p>
+        </p:txBody>
+      </p:sp>
+    </p:spTree>
+    <p:extLst>
+      <p:ext uri="{BB962C8B-B14F-4D97-AF65-F5344CB8AC3E}">
+        <p14:creationId xmlns:p14="http://schemas.microsoft.com/office/powerpoint/2010/main" val="221573624"/>
+      </p:ext>
+    </p:extLst>
+  </p:cSld>
+  <p:clrMapOvr>
+    <a:masterClrMapping/>
+  </p:clrMapOvr>
+  <p:timing>
+    <p:tnLst>
+      <p:par>
+        <p:cTn id="1" dur="indefinite" restart="never" nodeType="tmRoot"/>
+      </p:par>
+    </p:tnLst>
+  </p:timing>
+</p:sld>
+</file>
+
+<file path=ppt/slides/slide44.xml><?xml version="1.0" encoding="utf-8"?>
 <p:sld xmlns:a="http://schemas.openxmlformats.org/drawingml/2006/main" xmlns:r="http://schemas.openxmlformats.org/officeDocument/2006/relationships" xmlns:p="http://schemas.openxmlformats.org/presentationml/2006/main">
   <p:cSld>
     <p:spTree>
@@ -11363,7 +11999,7 @@
     </p:spTree>
     <p:extLst>
       <p:ext uri="{BB962C8B-B14F-4D97-AF65-F5344CB8AC3E}">
-        <p14:creationId xmlns:p14="http://schemas.microsoft.com/office/powerpoint/2010/main" val="221573624"/>
+        <p14:creationId xmlns:p14="http://schemas.microsoft.com/office/powerpoint/2010/main" val="1368460026"/>
       </p:ext>
     </p:extLst>
   </p:cSld>
@@ -11456,7 +12092,7 @@
 </p:sld>
 </file>
 
-<file path=ppt/slides/slide43.xml><?xml version="1.0" encoding="utf-8"?>
+<file path=ppt/slides/slide45.xml><?xml version="1.0" encoding="utf-8"?>
 <p:sld xmlns:a="http://schemas.openxmlformats.org/drawingml/2006/main" xmlns:r="http://schemas.openxmlformats.org/officeDocument/2006/relationships" xmlns:p="http://schemas.openxmlformats.org/presentationml/2006/main">
   <p:cSld>
     <p:spTree>
@@ -11568,7 +12204,7 @@
 </p:sld>
 </file>
 
-<file path=ppt/slides/slide44.xml><?xml version="1.0" encoding="utf-8"?>
+<file path=ppt/slides/slide46.xml><?xml version="1.0" encoding="utf-8"?>
 <p:sld xmlns:a="http://schemas.openxmlformats.org/drawingml/2006/main" xmlns:r="http://schemas.openxmlformats.org/officeDocument/2006/relationships" xmlns:p="http://schemas.openxmlformats.org/presentationml/2006/main">
   <p:cSld>
     <p:spTree>
@@ -11666,7 +12302,7 @@
 </p:sld>
 </file>
 
-<file path=ppt/slides/slide45.xml><?xml version="1.0" encoding="utf-8"?>
+<file path=ppt/slides/slide47.xml><?xml version="1.0" encoding="utf-8"?>
 <p:sld xmlns:a="http://schemas.openxmlformats.org/drawingml/2006/main" xmlns:r="http://schemas.openxmlformats.org/officeDocument/2006/relationships" xmlns:p="http://schemas.openxmlformats.org/presentationml/2006/main">
   <p:cSld>
     <p:spTree>
@@ -11779,7 +12415,7 @@
 </p:sld>
 </file>
 
-<file path=ppt/slides/slide46.xml><?xml version="1.0" encoding="utf-8"?>
+<file path=ppt/slides/slide48.xml><?xml version="1.0" encoding="utf-8"?>
 <p:sld xmlns:a="http://schemas.openxmlformats.org/drawingml/2006/main" xmlns:r="http://schemas.openxmlformats.org/officeDocument/2006/relationships" xmlns:p="http://schemas.openxmlformats.org/presentationml/2006/main">
   <p:cSld>
     <p:spTree>
@@ -12057,217 +12693,6 @@
 </p:sld>
 </file>
 
-<file path=ppt/slides/slide47.xml><?xml version="1.0" encoding="utf-8"?>
-<p:sld xmlns:a="http://schemas.openxmlformats.org/drawingml/2006/main" xmlns:r="http://schemas.openxmlformats.org/officeDocument/2006/relationships" xmlns:p="http://schemas.openxmlformats.org/presentationml/2006/main">
-  <p:cSld>
-    <p:spTree>
-      <p:nvGrpSpPr>
-        <p:cNvPr id="1" name=""/>
-        <p:cNvGrpSpPr/>
-        <p:nvPr/>
-      </p:nvGrpSpPr>
-      <p:grpSpPr>
-        <a:xfrm>
-          <a:off x="0" y="0"/>
-          <a:ext cx="0" cy="0"/>
-          <a:chOff x="0" y="0"/>
-          <a:chExt cx="0" cy="0"/>
-        </a:xfrm>
-      </p:grpSpPr>
-      <p:sp>
-        <p:nvSpPr>
-          <p:cNvPr id="2" name="Title 1"/>
-          <p:cNvSpPr>
-            <a:spLocks noGrp="1"/>
-          </p:cNvSpPr>
-          <p:nvPr>
-            <p:ph type="title"/>
-          </p:nvPr>
-        </p:nvSpPr>
-        <p:spPr/>
-        <p:txBody>
-          <a:bodyPr/>
-          <a:lstStyle/>
-          <a:p>
-            <a:r>
-              <a:rPr lang="en-GB" dirty="0" smtClean="0"/>
-              <a:t>Some theorems in Quantum Information</a:t>
-            </a:r>
-            <a:endParaRPr lang="en-GB" dirty="0"/>
-          </a:p>
-        </p:txBody>
-      </p:sp>
-      <p:sp>
-        <p:nvSpPr>
-          <p:cNvPr id="3" name="Content Placeholder 2"/>
-          <p:cNvSpPr>
-            <a:spLocks noGrp="1"/>
-          </p:cNvSpPr>
-          <p:nvPr>
-            <p:ph idx="1"/>
-          </p:nvPr>
-        </p:nvSpPr>
-        <p:spPr/>
-        <p:txBody>
-          <a:bodyPr/>
-          <a:lstStyle/>
-          <a:p>
-            <a:r>
-              <a:rPr lang="en-GB" dirty="0" smtClean="0"/>
-              <a:t>The Noiseless Coding Theorem</a:t>
-            </a:r>
-          </a:p>
-          <a:p>
-            <a:r>
-              <a:rPr lang="en-GB" dirty="0" smtClean="0"/>
-              <a:t>The Noisy Channel Coding Theorem</a:t>
-            </a:r>
-          </a:p>
-          <a:p>
-            <a:r>
-              <a:rPr lang="en-GB" dirty="0" smtClean="0"/>
-              <a:t>Schumacher’s Noiseless Channel Coding Theorem</a:t>
-            </a:r>
-          </a:p>
-          <a:p>
-            <a:r>
-              <a:rPr lang="en-GB" dirty="0" smtClean="0"/>
-              <a:t>So on and so on</a:t>
-            </a:r>
-            <a:r>
-              <a:rPr lang="mr-IN" dirty="0" smtClean="0"/>
-              <a:t>…</a:t>
-            </a:r>
-            <a:endParaRPr lang="en-GB" dirty="0" smtClean="0"/>
-          </a:p>
-          <a:p>
-            <a:endParaRPr lang="en-GB" dirty="0"/>
-          </a:p>
-          <a:p>
-            <a:r>
-              <a:rPr lang="en-GB" dirty="0" smtClean="0"/>
-              <a:t>The implications are quite hard; let’s look these on a latter time.</a:t>
-            </a:r>
-            <a:endParaRPr lang="en-GB" dirty="0"/>
-          </a:p>
-        </p:txBody>
-      </p:sp>
-    </p:spTree>
-    <p:extLst>
-      <p:ext uri="{BB962C8B-B14F-4D97-AF65-F5344CB8AC3E}">
-        <p14:creationId xmlns:p14="http://schemas.microsoft.com/office/powerpoint/2010/main" val="1847221011"/>
-      </p:ext>
-    </p:extLst>
-  </p:cSld>
-  <p:clrMapOvr>
-    <a:masterClrMapping/>
-  </p:clrMapOvr>
-</p:sld>
-</file>
-
-<file path=ppt/slides/slide48.xml><?xml version="1.0" encoding="utf-8"?>
-<p:sld xmlns:a="http://schemas.openxmlformats.org/drawingml/2006/main" xmlns:r="http://schemas.openxmlformats.org/officeDocument/2006/relationships" xmlns:p="http://schemas.openxmlformats.org/presentationml/2006/main">
-  <p:cSld>
-    <p:spTree>
-      <p:nvGrpSpPr>
-        <p:cNvPr id="1" name=""/>
-        <p:cNvGrpSpPr/>
-        <p:nvPr/>
-      </p:nvGrpSpPr>
-      <p:grpSpPr>
-        <a:xfrm>
-          <a:off x="0" y="0"/>
-          <a:ext cx="0" cy="0"/>
-          <a:chOff x="0" y="0"/>
-          <a:chExt cx="0" cy="0"/>
-        </a:xfrm>
-      </p:grpSpPr>
-      <p:sp>
-        <p:nvSpPr>
-          <p:cNvPr id="2" name="Title 1"/>
-          <p:cNvSpPr>
-            <a:spLocks noGrp="1"/>
-          </p:cNvSpPr>
-          <p:nvPr>
-            <p:ph type="title"/>
-          </p:nvPr>
-        </p:nvSpPr>
-        <p:spPr/>
-        <p:txBody>
-          <a:bodyPr/>
-          <a:lstStyle/>
-          <a:p>
-            <a:r>
-              <a:rPr lang="en-GB" dirty="0" smtClean="0"/>
-              <a:t>Quantum Distinguishability</a:t>
-            </a:r>
-            <a:endParaRPr lang="en-GB" dirty="0"/>
-          </a:p>
-        </p:txBody>
-      </p:sp>
-      <p:sp>
-        <p:nvSpPr>
-          <p:cNvPr id="3" name="Content Placeholder 2"/>
-          <p:cNvSpPr>
-            <a:spLocks noGrp="1"/>
-          </p:cNvSpPr>
-          <p:nvPr>
-            <p:ph idx="1"/>
-          </p:nvPr>
-        </p:nvSpPr>
-        <p:spPr/>
-        <p:txBody>
-          <a:bodyPr/>
-          <a:lstStyle/>
-          <a:p>
-            <a:r>
-              <a:rPr lang="en-GB" dirty="0" smtClean="0"/>
-              <a:t>The rules of QM makes us impossible to distinguish between arbitrary states (</a:t>
-            </a:r>
-            <a:r>
-              <a:rPr lang="en-GB" dirty="0" err="1" smtClean="0"/>
-              <a:t>kets</a:t>
-            </a:r>
-            <a:r>
-              <a:rPr lang="en-GB" dirty="0" smtClean="0"/>
-              <a:t>).</a:t>
-            </a:r>
-          </a:p>
-          <a:p>
-            <a:r>
-              <a:rPr lang="en-GB" dirty="0" smtClean="0"/>
-              <a:t>For example, if we measured l1&gt;, can we know what exact state was the measurement derived from?</a:t>
-            </a:r>
-          </a:p>
-          <a:p>
-            <a:r>
-              <a:rPr lang="en-GB" dirty="0" smtClean="0"/>
-              <a:t>Quantum state contains information that CANNOT be accessed by measuring: important in Cryptography!</a:t>
-            </a:r>
-            <a:endParaRPr lang="en-GB" dirty="0"/>
-          </a:p>
-        </p:txBody>
-      </p:sp>
-    </p:spTree>
-    <p:extLst>
-      <p:ext uri="{BB962C8B-B14F-4D97-AF65-F5344CB8AC3E}">
-        <p14:creationId xmlns:p14="http://schemas.microsoft.com/office/powerpoint/2010/main" val="1561036220"/>
-      </p:ext>
-    </p:extLst>
-  </p:cSld>
-  <p:clrMapOvr>
-    <a:masterClrMapping/>
-  </p:clrMapOvr>
-  <p:timing>
-    <p:tnLst>
-      <p:par>
-        <p:cTn id="1" dur="indefinite" restart="never" nodeType="tmRoot"/>
-      </p:par>
-    </p:tnLst>
-  </p:timing>
-</p:sld>
-</file>
-
 <file path=ppt/slides/slide49.xml><?xml version="1.0" encoding="utf-8"?>
 <p:sld xmlns:a="http://schemas.openxmlformats.org/drawingml/2006/main" xmlns:r="http://schemas.openxmlformats.org/officeDocument/2006/relationships" xmlns:p="http://schemas.openxmlformats.org/presentationml/2006/main">
   <p:cSld>
@@ -12302,7 +12727,7 @@
           <a:p>
             <a:r>
               <a:rPr lang="en-GB" dirty="0" smtClean="0"/>
-              <a:t>Quantum Distinguishability</a:t>
+              <a:t>Some theorems in Quantum Information</a:t>
             </a:r>
             <a:endParaRPr lang="en-GB" dirty="0"/>
           </a:p>
@@ -12325,8 +12750,31 @@
           <a:p>
             <a:r>
               <a:rPr lang="en-GB" dirty="0" smtClean="0"/>
-              <a:t>What if we can distinguish non-orthogonal states?</a:t>
-            </a:r>
+              <a:t>The Noiseless Coding Theorem</a:t>
+            </a:r>
+          </a:p>
+          <a:p>
+            <a:r>
+              <a:rPr lang="en-GB" dirty="0" smtClean="0"/>
+              <a:t>The Noisy Channel Coding Theorem</a:t>
+            </a:r>
+          </a:p>
+          <a:p>
+            <a:r>
+              <a:rPr lang="en-GB" dirty="0" smtClean="0"/>
+              <a:t>Schumacher’s Noiseless Channel Coding Theorem</a:t>
+            </a:r>
+          </a:p>
+          <a:p>
+            <a:r>
+              <a:rPr lang="en-GB" dirty="0" smtClean="0"/>
+              <a:t>So on and so on</a:t>
+            </a:r>
+            <a:r>
+              <a:rPr lang="mr-IN" dirty="0" smtClean="0"/>
+              <a:t>…</a:t>
+            </a:r>
+            <a:endParaRPr lang="en-GB" dirty="0" smtClean="0"/>
           </a:p>
           <a:p>
             <a:endParaRPr lang="en-GB" dirty="0"/>
@@ -12334,13 +12782,7 @@
           <a:p>
             <a:r>
               <a:rPr lang="en-GB" dirty="0" smtClean="0"/>
-              <a:t>1. Using EPR pairs, faster-than-light communications are feasible.</a:t>
-            </a:r>
-          </a:p>
-          <a:p>
-            <a:r>
-              <a:rPr lang="en-GB" dirty="0" smtClean="0"/>
-              <a:t>2. We can make a cloning machine!</a:t>
+              <a:t>The implications are quite hard; let’s look these on a latter time.</a:t>
             </a:r>
             <a:endParaRPr lang="en-GB" dirty="0"/>
           </a:p>
@@ -12349,20 +12791,13 @@
     </p:spTree>
     <p:extLst>
       <p:ext uri="{BB962C8B-B14F-4D97-AF65-F5344CB8AC3E}">
-        <p14:creationId xmlns:p14="http://schemas.microsoft.com/office/powerpoint/2010/main" val="946811105"/>
+        <p14:creationId xmlns:p14="http://schemas.microsoft.com/office/powerpoint/2010/main" val="1847221011"/>
       </p:ext>
     </p:extLst>
   </p:cSld>
   <p:clrMapOvr>
     <a:masterClrMapping/>
   </p:clrMapOvr>
-  <p:timing>
-    <p:tnLst>
-      <p:par>
-        <p:cTn id="1" dur="indefinite" restart="never" nodeType="tmRoot"/>
-      </p:par>
-    </p:tnLst>
-  </p:timing>
 </p:sld>
 </file>
 
@@ -12541,6 +12976,207 @@
           <a:p>
             <a:r>
               <a:rPr lang="en-GB" dirty="0" smtClean="0"/>
+              <a:t>Quantum Distinguishability</a:t>
+            </a:r>
+            <a:endParaRPr lang="en-GB" dirty="0"/>
+          </a:p>
+        </p:txBody>
+      </p:sp>
+      <p:sp>
+        <p:nvSpPr>
+          <p:cNvPr id="3" name="Content Placeholder 2"/>
+          <p:cNvSpPr>
+            <a:spLocks noGrp="1"/>
+          </p:cNvSpPr>
+          <p:nvPr>
+            <p:ph idx="1"/>
+          </p:nvPr>
+        </p:nvSpPr>
+        <p:spPr/>
+        <p:txBody>
+          <a:bodyPr/>
+          <a:lstStyle/>
+          <a:p>
+            <a:r>
+              <a:rPr lang="en-GB" dirty="0" smtClean="0"/>
+              <a:t>The rules of QM makes us impossible to distinguish between arbitrary states (</a:t>
+            </a:r>
+            <a:r>
+              <a:rPr lang="en-GB" dirty="0" err="1" smtClean="0"/>
+              <a:t>kets</a:t>
+            </a:r>
+            <a:r>
+              <a:rPr lang="en-GB" dirty="0" smtClean="0"/>
+              <a:t>).</a:t>
+            </a:r>
+          </a:p>
+          <a:p>
+            <a:r>
+              <a:rPr lang="en-GB" dirty="0" smtClean="0"/>
+              <a:t>For example, if we measured l1&gt;, can we know what exact state was the measurement derived from?</a:t>
+            </a:r>
+          </a:p>
+          <a:p>
+            <a:r>
+              <a:rPr lang="en-GB" dirty="0" smtClean="0"/>
+              <a:t>Quantum state contains information that CANNOT be accessed by measuring: important in Cryptography!</a:t>
+            </a:r>
+            <a:endParaRPr lang="en-GB" dirty="0"/>
+          </a:p>
+        </p:txBody>
+      </p:sp>
+    </p:spTree>
+    <p:extLst>
+      <p:ext uri="{BB962C8B-B14F-4D97-AF65-F5344CB8AC3E}">
+        <p14:creationId xmlns:p14="http://schemas.microsoft.com/office/powerpoint/2010/main" val="1561036220"/>
+      </p:ext>
+    </p:extLst>
+  </p:cSld>
+  <p:clrMapOvr>
+    <a:masterClrMapping/>
+  </p:clrMapOvr>
+  <p:timing>
+    <p:tnLst>
+      <p:par>
+        <p:cTn id="1" dur="indefinite" restart="never" nodeType="tmRoot"/>
+      </p:par>
+    </p:tnLst>
+  </p:timing>
+</p:sld>
+</file>
+
+<file path=ppt/slides/slide51.xml><?xml version="1.0" encoding="utf-8"?>
+<p:sld xmlns:a="http://schemas.openxmlformats.org/drawingml/2006/main" xmlns:r="http://schemas.openxmlformats.org/officeDocument/2006/relationships" xmlns:p="http://schemas.openxmlformats.org/presentationml/2006/main">
+  <p:cSld>
+    <p:spTree>
+      <p:nvGrpSpPr>
+        <p:cNvPr id="1" name=""/>
+        <p:cNvGrpSpPr/>
+        <p:nvPr/>
+      </p:nvGrpSpPr>
+      <p:grpSpPr>
+        <a:xfrm>
+          <a:off x="0" y="0"/>
+          <a:ext cx="0" cy="0"/>
+          <a:chOff x="0" y="0"/>
+          <a:chExt cx="0" cy="0"/>
+        </a:xfrm>
+      </p:grpSpPr>
+      <p:sp>
+        <p:nvSpPr>
+          <p:cNvPr id="2" name="Title 1"/>
+          <p:cNvSpPr>
+            <a:spLocks noGrp="1"/>
+          </p:cNvSpPr>
+          <p:nvPr>
+            <p:ph type="title"/>
+          </p:nvPr>
+        </p:nvSpPr>
+        <p:spPr/>
+        <p:txBody>
+          <a:bodyPr/>
+          <a:lstStyle/>
+          <a:p>
+            <a:r>
+              <a:rPr lang="en-GB" dirty="0" smtClean="0"/>
+              <a:t>Quantum Distinguishability</a:t>
+            </a:r>
+            <a:endParaRPr lang="en-GB" dirty="0"/>
+          </a:p>
+        </p:txBody>
+      </p:sp>
+      <p:sp>
+        <p:nvSpPr>
+          <p:cNvPr id="3" name="Content Placeholder 2"/>
+          <p:cNvSpPr>
+            <a:spLocks noGrp="1"/>
+          </p:cNvSpPr>
+          <p:nvPr>
+            <p:ph idx="1"/>
+          </p:nvPr>
+        </p:nvSpPr>
+        <p:spPr/>
+        <p:txBody>
+          <a:bodyPr/>
+          <a:lstStyle/>
+          <a:p>
+            <a:r>
+              <a:rPr lang="en-GB" dirty="0" smtClean="0"/>
+              <a:t>What if we can distinguish non-orthogonal states?</a:t>
+            </a:r>
+          </a:p>
+          <a:p>
+            <a:endParaRPr lang="en-GB" dirty="0"/>
+          </a:p>
+          <a:p>
+            <a:r>
+              <a:rPr lang="en-GB" dirty="0" smtClean="0"/>
+              <a:t>1. Using EPR pairs, faster-than-light communications are feasible.</a:t>
+            </a:r>
+          </a:p>
+          <a:p>
+            <a:r>
+              <a:rPr lang="en-GB" dirty="0" smtClean="0"/>
+              <a:t>2. We can make a cloning machine!</a:t>
+            </a:r>
+            <a:endParaRPr lang="en-GB" dirty="0"/>
+          </a:p>
+        </p:txBody>
+      </p:sp>
+    </p:spTree>
+    <p:extLst>
+      <p:ext uri="{BB962C8B-B14F-4D97-AF65-F5344CB8AC3E}">
+        <p14:creationId xmlns:p14="http://schemas.microsoft.com/office/powerpoint/2010/main" val="946811105"/>
+      </p:ext>
+    </p:extLst>
+  </p:cSld>
+  <p:clrMapOvr>
+    <a:masterClrMapping/>
+  </p:clrMapOvr>
+  <p:timing>
+    <p:tnLst>
+      <p:par>
+        <p:cTn id="1" dur="indefinite" restart="never" nodeType="tmRoot"/>
+      </p:par>
+    </p:tnLst>
+  </p:timing>
+</p:sld>
+</file>
+
+<file path=ppt/slides/slide52.xml><?xml version="1.0" encoding="utf-8"?>
+<p:sld xmlns:a="http://schemas.openxmlformats.org/drawingml/2006/main" xmlns:r="http://schemas.openxmlformats.org/officeDocument/2006/relationships" xmlns:p="http://schemas.openxmlformats.org/presentationml/2006/main">
+  <p:cSld>
+    <p:spTree>
+      <p:nvGrpSpPr>
+        <p:cNvPr id="1" name=""/>
+        <p:cNvGrpSpPr/>
+        <p:nvPr/>
+      </p:nvGrpSpPr>
+      <p:grpSpPr>
+        <a:xfrm>
+          <a:off x="0" y="0"/>
+          <a:ext cx="0" cy="0"/>
+          <a:chOff x="0" y="0"/>
+          <a:chExt cx="0" cy="0"/>
+        </a:xfrm>
+      </p:grpSpPr>
+      <p:sp>
+        <p:nvSpPr>
+          <p:cNvPr id="2" name="Title 1"/>
+          <p:cNvSpPr>
+            <a:spLocks noGrp="1"/>
+          </p:cNvSpPr>
+          <p:nvPr>
+            <p:ph type="title"/>
+          </p:nvPr>
+        </p:nvSpPr>
+        <p:spPr/>
+        <p:txBody>
+          <a:bodyPr/>
+          <a:lstStyle/>
+          <a:p>
+            <a:r>
+              <a:rPr lang="en-GB" dirty="0" smtClean="0"/>
               <a:t>Entanglements</a:t>
             </a:r>
             <a:endParaRPr lang="en-GB" dirty="0"/>
@@ -12622,7 +13258,7 @@
 </p:sld>
 </file>
 
-<file path=ppt/slides/slide51.xml><?xml version="1.0" encoding="utf-8"?>
+<file path=ppt/slides/slide53.xml><?xml version="1.0" encoding="utf-8"?>
 <p:sld xmlns:a="http://schemas.openxmlformats.org/drawingml/2006/main" xmlns:r="http://schemas.openxmlformats.org/officeDocument/2006/relationships" xmlns:p="http://schemas.openxmlformats.org/presentationml/2006/main">
   <p:cSld>
     <p:spTree>
@@ -14250,4 +14886,265 @@
     </a:ext>
   </a:extLst>
 </a:theme>
+</file>
+
+<file path=ppt/theme/theme2.xml><?xml version="1.0" encoding="utf-8"?>
+<a:theme xmlns:a="http://schemas.openxmlformats.org/drawingml/2006/main" name="Office Theme">
+  <a:themeElements>
+    <a:clrScheme name="Office">
+      <a:dk1>
+        <a:sysClr val="windowText" lastClr="000000"/>
+      </a:dk1>
+      <a:lt1>
+        <a:sysClr val="window" lastClr="FFFFFF"/>
+      </a:lt1>
+      <a:dk2>
+        <a:srgbClr val="44546A"/>
+      </a:dk2>
+      <a:lt2>
+        <a:srgbClr val="E7E6E6"/>
+      </a:lt2>
+      <a:accent1>
+        <a:srgbClr val="4472C4"/>
+      </a:accent1>
+      <a:accent2>
+        <a:srgbClr val="ED7D31"/>
+      </a:accent2>
+      <a:accent3>
+        <a:srgbClr val="A5A5A5"/>
+      </a:accent3>
+      <a:accent4>
+        <a:srgbClr val="FFC000"/>
+      </a:accent4>
+      <a:accent5>
+        <a:srgbClr val="5B9BD5"/>
+      </a:accent5>
+      <a:accent6>
+        <a:srgbClr val="70AD47"/>
+      </a:accent6>
+      <a:hlink>
+        <a:srgbClr val="0563C1"/>
+      </a:hlink>
+      <a:folHlink>
+        <a:srgbClr val="954F72"/>
+      </a:folHlink>
+    </a:clrScheme>
+    <a:fontScheme name="Office">
+      <a:majorFont>
+        <a:latin typeface="Calibri Light" panose="020F0302020204030204"/>
+        <a:ea typeface=""/>
+        <a:cs typeface=""/>
+        <a:font script="Jpan" typeface="Yu Gothic Light"/>
+        <a:font script="Hang" typeface="맑은 고딕"/>
+        <a:font script="Hans" typeface="DengXian Light"/>
+        <a:font script="Hant" typeface="新細明體"/>
+        <a:font script="Arab" typeface="Times New Roman"/>
+        <a:font script="Hebr" typeface="Times New Roman"/>
+        <a:font script="Thai" typeface="Angsana New"/>
+        <a:font script="Ethi" typeface="Nyala"/>
+        <a:font script="Beng" typeface="Vrinda"/>
+        <a:font script="Gujr" typeface="Shruti"/>
+        <a:font script="Khmr" typeface="MoolBoran"/>
+        <a:font script="Knda" typeface="Tunga"/>
+        <a:font script="Guru" typeface="Raavi"/>
+        <a:font script="Cans" typeface="Euphemia"/>
+        <a:font script="Cher" typeface="Plantagenet Cherokee"/>
+        <a:font script="Yiii" typeface="Microsoft Yi Baiti"/>
+        <a:font script="Tibt" typeface="Microsoft Himalaya"/>
+        <a:font script="Thaa" typeface="MV Boli"/>
+        <a:font script="Deva" typeface="Mangal"/>
+        <a:font script="Telu" typeface="Gautami"/>
+        <a:font script="Taml" typeface="Latha"/>
+        <a:font script="Syrc" typeface="Estrangelo Edessa"/>
+        <a:font script="Orya" typeface="Kalinga"/>
+        <a:font script="Mlym" typeface="Kartika"/>
+        <a:font script="Laoo" typeface="DokChampa"/>
+        <a:font script="Sinh" typeface="Iskoola Pota"/>
+        <a:font script="Mong" typeface="Mongolian Baiti"/>
+        <a:font script="Viet" typeface="Times New Roman"/>
+        <a:font script="Uigh" typeface="Microsoft Uighur"/>
+        <a:font script="Geor" typeface="Sylfaen"/>
+      </a:majorFont>
+      <a:minorFont>
+        <a:latin typeface="Calibri" panose="020F0502020204030204"/>
+        <a:ea typeface=""/>
+        <a:cs typeface=""/>
+        <a:font script="Jpan" typeface="Yu Gothic"/>
+        <a:font script="Hang" typeface="맑은 고딕"/>
+        <a:font script="Hans" typeface="DengXian"/>
+        <a:font script="Hant" typeface="新細明體"/>
+        <a:font script="Arab" typeface="Arial"/>
+        <a:font script="Hebr" typeface="Arial"/>
+        <a:font script="Thai" typeface="Cordia New"/>
+        <a:font script="Ethi" typeface="Nyala"/>
+        <a:font script="Beng" typeface="Vrinda"/>
+        <a:font script="Gujr" typeface="Shruti"/>
+        <a:font script="Khmr" typeface="DaunPenh"/>
+        <a:font script="Knda" typeface="Tunga"/>
+        <a:font script="Guru" typeface="Raavi"/>
+        <a:font script="Cans" typeface="Euphemia"/>
+        <a:font script="Cher" typeface="Plantagenet Cherokee"/>
+        <a:font script="Yiii" typeface="Microsoft Yi Baiti"/>
+        <a:font script="Tibt" typeface="Microsoft Himalaya"/>
+        <a:font script="Thaa" typeface="MV Boli"/>
+        <a:font script="Deva" typeface="Mangal"/>
+        <a:font script="Telu" typeface="Gautami"/>
+        <a:font script="Taml" typeface="Latha"/>
+        <a:font script="Syrc" typeface="Estrangelo Edessa"/>
+        <a:font script="Orya" typeface="Kalinga"/>
+        <a:font script="Mlym" typeface="Kartika"/>
+        <a:font script="Laoo" typeface="DokChampa"/>
+        <a:font script="Sinh" typeface="Iskoola Pota"/>
+        <a:font script="Mong" typeface="Mongolian Baiti"/>
+        <a:font script="Viet" typeface="Arial"/>
+        <a:font script="Uigh" typeface="Microsoft Uighur"/>
+        <a:font script="Geor" typeface="Sylfaen"/>
+      </a:minorFont>
+    </a:fontScheme>
+    <a:fmtScheme name="Office">
+      <a:fillStyleLst>
+        <a:solidFill>
+          <a:schemeClr val="phClr"/>
+        </a:solidFill>
+        <a:gradFill rotWithShape="1">
+          <a:gsLst>
+            <a:gs pos="0">
+              <a:schemeClr val="phClr">
+                <a:lumMod val="110000"/>
+                <a:satMod val="105000"/>
+                <a:tint val="67000"/>
+              </a:schemeClr>
+            </a:gs>
+            <a:gs pos="50000">
+              <a:schemeClr val="phClr">
+                <a:lumMod val="105000"/>
+                <a:satMod val="103000"/>
+                <a:tint val="73000"/>
+              </a:schemeClr>
+            </a:gs>
+            <a:gs pos="100000">
+              <a:schemeClr val="phClr">
+                <a:lumMod val="105000"/>
+                <a:satMod val="109000"/>
+                <a:tint val="81000"/>
+              </a:schemeClr>
+            </a:gs>
+          </a:gsLst>
+          <a:lin ang="5400000" scaled="0"/>
+        </a:gradFill>
+        <a:gradFill rotWithShape="1">
+          <a:gsLst>
+            <a:gs pos="0">
+              <a:schemeClr val="phClr">
+                <a:satMod val="103000"/>
+                <a:lumMod val="102000"/>
+                <a:tint val="94000"/>
+              </a:schemeClr>
+            </a:gs>
+            <a:gs pos="50000">
+              <a:schemeClr val="phClr">
+                <a:satMod val="110000"/>
+                <a:lumMod val="100000"/>
+                <a:shade val="100000"/>
+              </a:schemeClr>
+            </a:gs>
+            <a:gs pos="100000">
+              <a:schemeClr val="phClr">
+                <a:lumMod val="99000"/>
+                <a:satMod val="120000"/>
+                <a:shade val="78000"/>
+              </a:schemeClr>
+            </a:gs>
+          </a:gsLst>
+          <a:lin ang="5400000" scaled="0"/>
+        </a:gradFill>
+      </a:fillStyleLst>
+      <a:lnStyleLst>
+        <a:ln w="6350" cap="flat" cmpd="sng" algn="ctr">
+          <a:solidFill>
+            <a:schemeClr val="phClr"/>
+          </a:solidFill>
+          <a:prstDash val="solid"/>
+          <a:miter lim="800000"/>
+        </a:ln>
+        <a:ln w="12700" cap="flat" cmpd="sng" algn="ctr">
+          <a:solidFill>
+            <a:schemeClr val="phClr"/>
+          </a:solidFill>
+          <a:prstDash val="solid"/>
+          <a:miter lim="800000"/>
+        </a:ln>
+        <a:ln w="19050" cap="flat" cmpd="sng" algn="ctr">
+          <a:solidFill>
+            <a:schemeClr val="phClr"/>
+          </a:solidFill>
+          <a:prstDash val="solid"/>
+          <a:miter lim="800000"/>
+        </a:ln>
+      </a:lnStyleLst>
+      <a:effectStyleLst>
+        <a:effectStyle>
+          <a:effectLst/>
+        </a:effectStyle>
+        <a:effectStyle>
+          <a:effectLst/>
+        </a:effectStyle>
+        <a:effectStyle>
+          <a:effectLst>
+            <a:outerShdw blurRad="57150" dist="19050" dir="5400000" algn="ctr" rotWithShape="0">
+              <a:srgbClr val="000000">
+                <a:alpha val="63000"/>
+              </a:srgbClr>
+            </a:outerShdw>
+          </a:effectLst>
+        </a:effectStyle>
+      </a:effectStyleLst>
+      <a:bgFillStyleLst>
+        <a:solidFill>
+          <a:schemeClr val="phClr"/>
+        </a:solidFill>
+        <a:solidFill>
+          <a:schemeClr val="phClr">
+            <a:tint val="95000"/>
+            <a:satMod val="170000"/>
+          </a:schemeClr>
+        </a:solidFill>
+        <a:gradFill rotWithShape="1">
+          <a:gsLst>
+            <a:gs pos="0">
+              <a:schemeClr val="phClr">
+                <a:tint val="93000"/>
+                <a:satMod val="150000"/>
+                <a:shade val="98000"/>
+                <a:lumMod val="102000"/>
+              </a:schemeClr>
+            </a:gs>
+            <a:gs pos="50000">
+              <a:schemeClr val="phClr">
+                <a:tint val="98000"/>
+                <a:satMod val="130000"/>
+                <a:shade val="90000"/>
+                <a:lumMod val="103000"/>
+              </a:schemeClr>
+            </a:gs>
+            <a:gs pos="100000">
+              <a:schemeClr val="phClr">
+                <a:shade val="63000"/>
+                <a:satMod val="120000"/>
+              </a:schemeClr>
+            </a:gs>
+          </a:gsLst>
+          <a:lin ang="5400000" scaled="0"/>
+        </a:gradFill>
+      </a:bgFillStyleLst>
+    </a:fmtScheme>
+  </a:themeElements>
+  <a:objectDefaults/>
+  <a:extraClrSchemeLst/>
+  <a:extLst>
+    <a:ext uri="{05A4C25C-085E-4340-85A3-A5531E510DB2}">
+      <thm15:themeFamily xmlns:thm15="http://schemas.microsoft.com/office/thememl/2012/main" name="Office Theme" id="{62F939B6-93AF-4DB8-9C6B-D6C7DFDC589F}" vid="{4A3C46E8-61CC-4603-A589-7422A47A8E4A}"/>
+    </a:ext>
+  </a:extLst>
+</a:theme>
 </file>
</xml_diff>